<commit_message>
ppt kiegészítése platformmal és záródiával
</commit_message>
<xml_diff>
--- a/Post-production/JMTV_L.pptx
+++ b/Post-production/JMTV_L.pptx
@@ -13,8 +13,10 @@
     <p:sldId id="261" r:id="rId7"/>
     <p:sldId id="262" r:id="rId8"/>
     <p:sldId id="263" r:id="rId9"/>
-    <p:sldId id="264" r:id="rId10"/>
-    <p:sldId id="265" r:id="rId11"/>
+    <p:sldId id="266" r:id="rId10"/>
+    <p:sldId id="264" r:id="rId11"/>
+    <p:sldId id="265" r:id="rId12"/>
+    <p:sldId id="296" r:id="rId13"/>
   </p:sldIdLst>
   <p:sldSz cx="12192000" cy="6858000"/>
   <p:notesSz cx="6858000" cy="9144000"/>
@@ -113,6 +115,11 @@
       </a:defRPr>
     </a:lvl9pPr>
   </p:defaultTextStyle>
+  <p:extLst>
+    <p:ext uri="{EFAFB233-063F-42B5-8137-9DF3F51BA10A}">
+      <p15:sldGuideLst xmlns:p15="http://schemas.microsoft.com/office/powerpoint/2012/main"/>
+    </p:ext>
+  </p:extLst>
 </p:presentation>
 </file>
 
@@ -301,7 +308,7 @@
           <a:p>
             <a:fld id="{5E2C5400-1422-4EF1-9C72-E846E2CBB57A}" type="datetimeFigureOut">
               <a:rPr lang="hu-HU" smtClean="0"/>
-              <a:t>2021. 11. 08.</a:t>
+              <a:t>2021. 11. 11.</a:t>
             </a:fld>
             <a:endParaRPr lang="hu-HU"/>
           </a:p>
@@ -599,7 +606,7 @@
           <a:p>
             <a:fld id="{5E2C5400-1422-4EF1-9C72-E846E2CBB57A}" type="datetimeFigureOut">
               <a:rPr lang="hu-HU" smtClean="0"/>
-              <a:t>2021. 11. 08.</a:t>
+              <a:t>2021. 11. 11.</a:t>
             </a:fld>
             <a:endParaRPr lang="hu-HU"/>
           </a:p>
@@ -791,7 +798,7 @@
           <a:p>
             <a:fld id="{5E2C5400-1422-4EF1-9C72-E846E2CBB57A}" type="datetimeFigureOut">
               <a:rPr lang="hu-HU" smtClean="0"/>
-              <a:t>2021. 11. 08.</a:t>
+              <a:t>2021. 11. 11.</a:t>
             </a:fld>
             <a:endParaRPr lang="hu-HU"/>
           </a:p>
@@ -1052,7 +1059,7 @@
           <a:p>
             <a:fld id="{5E2C5400-1422-4EF1-9C72-E846E2CBB57A}" type="datetimeFigureOut">
               <a:rPr lang="hu-HU" smtClean="0"/>
-              <a:t>2021. 11. 08.</a:t>
+              <a:t>2021. 11. 11.</a:t>
             </a:fld>
             <a:endParaRPr lang="hu-HU"/>
           </a:p>
@@ -1476,7 +1483,7 @@
           <a:p>
             <a:fld id="{5E2C5400-1422-4EF1-9C72-E846E2CBB57A}" type="datetimeFigureOut">
               <a:rPr lang="hu-HU" smtClean="0"/>
-              <a:t>2021. 11. 08.</a:t>
+              <a:t>2021. 11. 11.</a:t>
             </a:fld>
             <a:endParaRPr lang="hu-HU"/>
           </a:p>
@@ -2013,7 +2020,7 @@
           <a:p>
             <a:fld id="{5E2C5400-1422-4EF1-9C72-E846E2CBB57A}" type="datetimeFigureOut">
               <a:rPr lang="hu-HU" smtClean="0"/>
-              <a:t>2021. 11. 08.</a:t>
+              <a:t>2021. 11. 11.</a:t>
             </a:fld>
             <a:endParaRPr lang="hu-HU"/>
           </a:p>
@@ -2877,7 +2884,7 @@
           <a:p>
             <a:fld id="{5E2C5400-1422-4EF1-9C72-E846E2CBB57A}" type="datetimeFigureOut">
               <a:rPr lang="hu-HU" smtClean="0"/>
-              <a:t>2021. 11. 08.</a:t>
+              <a:t>2021. 11. 11.</a:t>
             </a:fld>
             <a:endParaRPr lang="hu-HU"/>
           </a:p>
@@ -3047,7 +3054,7 @@
           <a:p>
             <a:fld id="{5E2C5400-1422-4EF1-9C72-E846E2CBB57A}" type="datetimeFigureOut">
               <a:rPr lang="hu-HU" smtClean="0"/>
-              <a:t>2021. 11. 08.</a:t>
+              <a:t>2021. 11. 11.</a:t>
             </a:fld>
             <a:endParaRPr lang="hu-HU"/>
           </a:p>
@@ -3231,7 +3238,7 @@
           <a:p>
             <a:fld id="{5E2C5400-1422-4EF1-9C72-E846E2CBB57A}" type="datetimeFigureOut">
               <a:rPr lang="hu-HU" smtClean="0"/>
-              <a:t>2021. 11. 08.</a:t>
+              <a:t>2021. 11. 11.</a:t>
             </a:fld>
             <a:endParaRPr lang="hu-HU"/>
           </a:p>
@@ -3401,7 +3408,7 @@
           <a:p>
             <a:fld id="{5E2C5400-1422-4EF1-9C72-E846E2CBB57A}" type="datetimeFigureOut">
               <a:rPr lang="hu-HU" smtClean="0"/>
-              <a:t>2021. 11. 08.</a:t>
+              <a:t>2021. 11. 11.</a:t>
             </a:fld>
             <a:endParaRPr lang="hu-HU"/>
           </a:p>
@@ -3645,7 +3652,7 @@
           <a:p>
             <a:fld id="{5E2C5400-1422-4EF1-9C72-E846E2CBB57A}" type="datetimeFigureOut">
               <a:rPr lang="hu-HU" smtClean="0"/>
-              <a:t>2021. 11. 08.</a:t>
+              <a:t>2021. 11. 11.</a:t>
             </a:fld>
             <a:endParaRPr lang="hu-HU"/>
           </a:p>
@@ -3881,7 +3888,7 @@
           <a:p>
             <a:fld id="{5E2C5400-1422-4EF1-9C72-E846E2CBB57A}" type="datetimeFigureOut">
               <a:rPr lang="hu-HU" smtClean="0"/>
-              <a:t>2021. 11. 08.</a:t>
+              <a:t>2021. 11. 11.</a:t>
             </a:fld>
             <a:endParaRPr lang="hu-HU"/>
           </a:p>
@@ -4347,7 +4354,7 @@
           <a:p>
             <a:fld id="{5E2C5400-1422-4EF1-9C72-E846E2CBB57A}" type="datetimeFigureOut">
               <a:rPr lang="hu-HU" smtClean="0"/>
-              <a:t>2021. 11. 08.</a:t>
+              <a:t>2021. 11. 11.</a:t>
             </a:fld>
             <a:endParaRPr lang="hu-HU"/>
           </a:p>
@@ -4465,7 +4472,7 @@
           <a:p>
             <a:fld id="{5E2C5400-1422-4EF1-9C72-E846E2CBB57A}" type="datetimeFigureOut">
               <a:rPr lang="hu-HU" smtClean="0"/>
-              <a:t>2021. 11. 08.</a:t>
+              <a:t>2021. 11. 11.</a:t>
             </a:fld>
             <a:endParaRPr lang="hu-HU"/>
           </a:p>
@@ -4560,7 +4567,7 @@
           <a:p>
             <a:fld id="{5E2C5400-1422-4EF1-9C72-E846E2CBB57A}" type="datetimeFigureOut">
               <a:rPr lang="hu-HU" smtClean="0"/>
-              <a:t>2021. 11. 08.</a:t>
+              <a:t>2021. 11. 11.</a:t>
             </a:fld>
             <a:endParaRPr lang="hu-HU"/>
           </a:p>
@@ -4815,7 +4822,7 @@
           <a:p>
             <a:fld id="{5E2C5400-1422-4EF1-9C72-E846E2CBB57A}" type="datetimeFigureOut">
               <a:rPr lang="hu-HU" smtClean="0"/>
-              <a:t>2021. 11. 08.</a:t>
+              <a:t>2021. 11. 11.</a:t>
             </a:fld>
             <a:endParaRPr lang="hu-HU"/>
           </a:p>
@@ -5115,7 +5122,7 @@
           <a:p>
             <a:fld id="{5E2C5400-1422-4EF1-9C72-E846E2CBB57A}" type="datetimeFigureOut">
               <a:rPr lang="hu-HU" smtClean="0"/>
-              <a:t>2021. 11. 08.</a:t>
+              <a:t>2021. 11. 11.</a:t>
             </a:fld>
             <a:endParaRPr lang="hu-HU"/>
           </a:p>
@@ -5349,7 +5356,7 @@
           <a:p>
             <a:fld id="{5E2C5400-1422-4EF1-9C72-E846E2CBB57A}" type="datetimeFigureOut">
               <a:rPr lang="hu-HU" smtClean="0"/>
-              <a:t>2021. 11. 08.</a:t>
+              <a:t>2021. 11. 11.</a:t>
             </a:fld>
             <a:endParaRPr lang="hu-HU"/>
           </a:p>
@@ -6174,6 +6181,369 @@
   <p:cSld>
     <p:bg>
       <p:bgPr>
+        <a:blipFill rotWithShape="1">
+          <a:blip r:embed="rId2">
+            <a:duotone>
+              <a:schemeClr val="bg2">
+                <a:shade val="80000"/>
+                <a:lumMod val="80000"/>
+              </a:schemeClr>
+              <a:schemeClr val="bg2">
+                <a:tint val="98000"/>
+              </a:schemeClr>
+            </a:duotone>
+          </a:blip>
+          <a:stretch/>
+        </a:blipFill>
+        <a:effectLst/>
+      </p:bgPr>
+    </p:bg>
+    <p:spTree>
+      <p:nvGrpSpPr>
+        <p:cNvPr id="1" name=""/>
+        <p:cNvGrpSpPr/>
+        <p:nvPr/>
+      </p:nvGrpSpPr>
+      <p:grpSpPr>
+        <a:xfrm>
+          <a:off x="0" y="0"/>
+          <a:ext cx="0" cy="0"/>
+          <a:chOff x="0" y="0"/>
+          <a:chExt cx="0" cy="0"/>
+        </a:xfrm>
+      </p:grpSpPr>
+      <p:pic>
+        <p:nvPicPr>
+          <p:cNvPr id="5" name="Kép 4" descr="A képen szöveg, személy, dokumentum látható&#10;&#10;Automatikusan generált leírás">
+            <a:extLst>
+              <a:ext uri="{FF2B5EF4-FFF2-40B4-BE49-F238E27FC236}">
+                <a16:creationId xmlns:a16="http://schemas.microsoft.com/office/drawing/2014/main" id="{D6A9AEA2-1B3B-40EE-A265-645CA0EACCFE}"/>
+              </a:ext>
+            </a:extLst>
+          </p:cNvPr>
+          <p:cNvPicPr>
+            <a:picLocks noChangeAspect="1"/>
+          </p:cNvPicPr>
+          <p:nvPr/>
+        </p:nvPicPr>
+        <p:blipFill rotWithShape="1">
+          <a:blip r:embed="rId3">
+            <a:extLst>
+              <a:ext uri="{28A0092B-C50C-407E-A947-70E740481C1C}">
+                <a14:useLocalDpi xmlns:a14="http://schemas.microsoft.com/office/drawing/2010/main" val="0"/>
+              </a:ext>
+            </a:extLst>
+          </a:blip>
+          <a:srcRect t="13866" b="1865"/>
+          <a:stretch/>
+        </p:blipFill>
+        <p:spPr>
+          <a:xfrm>
+            <a:off x="1" y="10"/>
+            <a:ext cx="12192000" cy="6857990"/>
+          </a:xfrm>
+          <a:prstGeom prst="rect">
+            <a:avLst/>
+          </a:prstGeom>
+        </p:spPr>
+      </p:pic>
+      <p:sp useBgFill="1">
+        <p:nvSpPr>
+          <p:cNvPr id="10" name="Freeform 5">
+            <a:extLst>
+              <a:ext uri="{FF2B5EF4-FFF2-40B4-BE49-F238E27FC236}">
+                <a16:creationId xmlns:a16="http://schemas.microsoft.com/office/drawing/2014/main" id="{37D54B6C-87D0-4C03-8335-3955179D2B5B}"/>
+              </a:ext>
+              <a:ext uri="{C183D7F6-B498-43B3-948B-1728B52AA6E4}">
+                <adec:decorative xmlns:adec="http://schemas.microsoft.com/office/drawing/2017/decorative" val="1"/>
+              </a:ext>
+            </a:extLst>
+          </p:cNvPr>
+          <p:cNvSpPr>
+            <a:spLocks noGrp="1" noRot="1" noChangeAspect="1" noMove="1" noResize="1" noEditPoints="1" noAdjustHandles="1" noChangeArrowheads="1" noChangeShapeType="1" noTextEdit="1"/>
+          </p:cNvSpPr>
+          <p:nvPr>
+            <p:extLst>
+              <p:ext uri="{386F3935-93C4-4BCD-93E2-E3B085C9AB24}">
+                <p16:designElem xmlns:p16="http://schemas.microsoft.com/office/powerpoint/2015/main" val="1"/>
+              </p:ext>
+            </p:extLst>
+          </p:nvPr>
+        </p:nvSpPr>
+        <p:spPr bwMode="auto">
+          <a:xfrm rot="5400000">
+            <a:off x="-118536" y="1371603"/>
+            <a:ext cx="5624423" cy="4100418"/>
+          </a:xfrm>
+          <a:custGeom>
+            <a:avLst/>
+            <a:gdLst>
+              <a:gd name="T0" fmla="*/ 1577 w 1601"/>
+              <a:gd name="T1" fmla="*/ 0 h 696"/>
+              <a:gd name="T2" fmla="*/ 833 w 1601"/>
+              <a:gd name="T3" fmla="*/ 0 h 696"/>
+              <a:gd name="T4" fmla="*/ 768 w 1601"/>
+              <a:gd name="T5" fmla="*/ 0 h 696"/>
+              <a:gd name="T6" fmla="*/ 24 w 1601"/>
+              <a:gd name="T7" fmla="*/ 0 h 696"/>
+              <a:gd name="T8" fmla="*/ 0 w 1601"/>
+              <a:gd name="T9" fmla="*/ 27 h 696"/>
+              <a:gd name="T10" fmla="*/ 0 w 1601"/>
+              <a:gd name="T11" fmla="*/ 669 h 696"/>
+              <a:gd name="T12" fmla="*/ 24 w 1601"/>
+              <a:gd name="T13" fmla="*/ 696 h 696"/>
+              <a:gd name="T14" fmla="*/ 768 w 1601"/>
+              <a:gd name="T15" fmla="*/ 696 h 696"/>
+              <a:gd name="T16" fmla="*/ 833 w 1601"/>
+              <a:gd name="T17" fmla="*/ 696 h 696"/>
+              <a:gd name="T18" fmla="*/ 1577 w 1601"/>
+              <a:gd name="T19" fmla="*/ 696 h 696"/>
+              <a:gd name="T20" fmla="*/ 1601 w 1601"/>
+              <a:gd name="T21" fmla="*/ 669 h 696"/>
+              <a:gd name="T22" fmla="*/ 1601 w 1601"/>
+              <a:gd name="T23" fmla="*/ 27 h 696"/>
+              <a:gd name="T24" fmla="*/ 1577 w 1601"/>
+              <a:gd name="T25" fmla="*/ 0 h 696"/>
+            </a:gdLst>
+            <a:ahLst/>
+            <a:cxnLst>
+              <a:cxn ang="0">
+                <a:pos x="T0" y="T1"/>
+              </a:cxn>
+              <a:cxn ang="0">
+                <a:pos x="T2" y="T3"/>
+              </a:cxn>
+              <a:cxn ang="0">
+                <a:pos x="T4" y="T5"/>
+              </a:cxn>
+              <a:cxn ang="0">
+                <a:pos x="T6" y="T7"/>
+              </a:cxn>
+              <a:cxn ang="0">
+                <a:pos x="T8" y="T9"/>
+              </a:cxn>
+              <a:cxn ang="0">
+                <a:pos x="T10" y="T11"/>
+              </a:cxn>
+              <a:cxn ang="0">
+                <a:pos x="T12" y="T13"/>
+              </a:cxn>
+              <a:cxn ang="0">
+                <a:pos x="T14" y="T15"/>
+              </a:cxn>
+              <a:cxn ang="0">
+                <a:pos x="T16" y="T17"/>
+              </a:cxn>
+              <a:cxn ang="0">
+                <a:pos x="T18" y="T19"/>
+              </a:cxn>
+              <a:cxn ang="0">
+                <a:pos x="T20" y="T21"/>
+              </a:cxn>
+              <a:cxn ang="0">
+                <a:pos x="T22" y="T23"/>
+              </a:cxn>
+              <a:cxn ang="0">
+                <a:pos x="T24" y="T25"/>
+              </a:cxn>
+            </a:cxnLst>
+            <a:rect l="0" t="0" r="r" b="b"/>
+            <a:pathLst>
+              <a:path w="1601" h="696">
+                <a:moveTo>
+                  <a:pt x="1577" y="0"/>
+                </a:moveTo>
+                <a:cubicBezTo>
+                  <a:pt x="833" y="0"/>
+                  <a:pt x="833" y="0"/>
+                  <a:pt x="833" y="0"/>
+                </a:cubicBezTo>
+                <a:cubicBezTo>
+                  <a:pt x="768" y="0"/>
+                  <a:pt x="768" y="0"/>
+                  <a:pt x="768" y="0"/>
+                </a:cubicBezTo>
+                <a:cubicBezTo>
+                  <a:pt x="24" y="0"/>
+                  <a:pt x="24" y="0"/>
+                  <a:pt x="24" y="0"/>
+                </a:cubicBezTo>
+                <a:cubicBezTo>
+                  <a:pt x="11" y="0"/>
+                  <a:pt x="0" y="12"/>
+                  <a:pt x="0" y="27"/>
+                </a:cubicBezTo>
+                <a:cubicBezTo>
+                  <a:pt x="0" y="669"/>
+                  <a:pt x="0" y="669"/>
+                  <a:pt x="0" y="669"/>
+                </a:cubicBezTo>
+                <a:cubicBezTo>
+                  <a:pt x="0" y="684"/>
+                  <a:pt x="11" y="696"/>
+                  <a:pt x="24" y="696"/>
+                </a:cubicBezTo>
+                <a:cubicBezTo>
+                  <a:pt x="768" y="696"/>
+                  <a:pt x="768" y="696"/>
+                  <a:pt x="768" y="696"/>
+                </a:cubicBezTo>
+                <a:cubicBezTo>
+                  <a:pt x="833" y="696"/>
+                  <a:pt x="833" y="696"/>
+                  <a:pt x="833" y="696"/>
+                </a:cubicBezTo>
+                <a:cubicBezTo>
+                  <a:pt x="1577" y="696"/>
+                  <a:pt x="1577" y="696"/>
+                  <a:pt x="1577" y="696"/>
+                </a:cubicBezTo>
+                <a:cubicBezTo>
+                  <a:pt x="1590" y="696"/>
+                  <a:pt x="1601" y="684"/>
+                  <a:pt x="1601" y="669"/>
+                </a:cubicBezTo>
+                <a:cubicBezTo>
+                  <a:pt x="1601" y="27"/>
+                  <a:pt x="1601" y="27"/>
+                  <a:pt x="1601" y="27"/>
+                </a:cubicBezTo>
+                <a:cubicBezTo>
+                  <a:pt x="1601" y="12"/>
+                  <a:pt x="1590" y="0"/>
+                  <a:pt x="1577" y="0"/>
+                </a:cubicBezTo>
+                <a:close/>
+              </a:path>
+            </a:pathLst>
+          </a:custGeom>
+          <a:ln>
+            <a:noFill/>
+          </a:ln>
+          <a:effectLst>
+            <a:outerShdw blurRad="50800" dist="38100" dir="5400000" algn="tl" rotWithShape="0">
+              <a:srgbClr val="000000">
+                <a:alpha val="43000"/>
+              </a:srgbClr>
+            </a:outerShdw>
+          </a:effectLst>
+          <a:extLst>
+            <a:ext uri="{91240B29-F687-4f45-9708-019B960494DF}">
+              <a14:hiddenLine xmlns:a14="http://schemas.microsoft.com/office/drawing/2010/main" xmlns:p14="http://schemas.microsoft.com/office/powerpoint/2010/main" xmlns:a16="http://schemas.microsoft.com/office/drawing/2014/main" xmlns="" w="9525">
+                <a:solidFill>
+                  <a:srgbClr val="000000"/>
+                </a:solidFill>
+                <a:round/>
+                <a:headEnd/>
+                <a:tailEnd/>
+              </a14:hiddenLine>
+            </a:ext>
+          </a:extLst>
+        </p:spPr>
+        <p:txBody>
+          <a:bodyPr vert="horz" wrap="square" lIns="91440" tIns="45720" rIns="91440" bIns="45720" numCol="1" anchor="t" anchorCtr="0" compatLnSpc="1">
+            <a:prstTxWarp prst="textNoShape">
+              <a:avLst/>
+            </a:prstTxWarp>
+          </a:bodyPr>
+          <a:lstStyle/>
+          <a:p>
+            <a:endParaRPr lang="en-US"/>
+          </a:p>
+        </p:txBody>
+      </p:sp>
+      <p:sp>
+        <p:nvSpPr>
+          <p:cNvPr id="2" name="Cím 1">
+            <a:extLst>
+              <a:ext uri="{FF2B5EF4-FFF2-40B4-BE49-F238E27FC236}">
+                <a16:creationId xmlns:a16="http://schemas.microsoft.com/office/drawing/2014/main" id="{58D53D3E-A1D8-418F-A1DF-1432AD39025F}"/>
+              </a:ext>
+            </a:extLst>
+          </p:cNvPr>
+          <p:cNvSpPr>
+            <a:spLocks noGrp="1"/>
+          </p:cNvSpPr>
+          <p:nvPr>
+            <p:ph type="title"/>
+          </p:nvPr>
+        </p:nvSpPr>
+        <p:spPr>
+          <a:xfrm>
+            <a:off x="913795" y="845388"/>
+            <a:ext cx="3596420" cy="979016"/>
+          </a:xfrm>
+        </p:spPr>
+        <p:txBody>
+          <a:bodyPr anchor="b">
+            <a:normAutofit/>
+          </a:bodyPr>
+          <a:lstStyle/>
+          <a:p>
+            <a:pPr algn="l"/>
+            <a:r>
+              <a:rPr lang="hu-HU" sz="2400" b="1" dirty="0"/>
+              <a:t>3. Projekt Átadása és Értékelése</a:t>
+            </a:r>
+          </a:p>
+        </p:txBody>
+      </p:sp>
+      <p:sp>
+        <p:nvSpPr>
+          <p:cNvPr id="3" name="Tartalom helye 2">
+            <a:extLst>
+              <a:ext uri="{FF2B5EF4-FFF2-40B4-BE49-F238E27FC236}">
+                <a16:creationId xmlns:a16="http://schemas.microsoft.com/office/drawing/2014/main" id="{E5EBA43E-BFDA-4125-A8B7-B569F8A83E92}"/>
+              </a:ext>
+            </a:extLst>
+          </p:cNvPr>
+          <p:cNvSpPr>
+            <a:spLocks noGrp="1"/>
+          </p:cNvSpPr>
+          <p:nvPr>
+            <p:ph idx="1"/>
+          </p:nvPr>
+        </p:nvSpPr>
+        <p:spPr>
+          <a:xfrm>
+            <a:off x="913795" y="1968237"/>
+            <a:ext cx="3531684" cy="3679189"/>
+          </a:xfrm>
+        </p:spPr>
+        <p:txBody>
+          <a:bodyPr anchor="t">
+            <a:normAutofit/>
+          </a:bodyPr>
+          <a:lstStyle/>
+          <a:p>
+            <a:pPr marL="36900" indent="0">
+              <a:buNone/>
+            </a:pPr>
+            <a:r>
+              <a:rPr lang="hu-HU" altLang="hu-HU" sz="1600"/>
+              <a:t>A projekt átadása  a sikeres tesztüzem és a sikeres internetre történő feltöltés után történik meg, mely során további egyeztetések követik és a projekt célok és azok megvalósulásainak ellenőrzése valósul meg.</a:t>
+            </a:r>
+          </a:p>
+        </p:txBody>
+      </p:sp>
+    </p:spTree>
+    <p:extLst>
+      <p:ext uri="{BB962C8B-B14F-4D97-AF65-F5344CB8AC3E}">
+        <p14:creationId xmlns:p14="http://schemas.microsoft.com/office/powerpoint/2010/main" val="2482923537"/>
+      </p:ext>
+    </p:extLst>
+  </p:cSld>
+  <p:clrMapOvr>
+    <a:masterClrMapping/>
+  </p:clrMapOvr>
+</p:sld>
+</file>
+
+<file path=ppt/slides/slide11.xml><?xml version="1.0" encoding="utf-8"?>
+<p:sld xmlns:a="http://schemas.openxmlformats.org/drawingml/2006/main" xmlns:r="http://schemas.openxmlformats.org/officeDocument/2006/relationships" xmlns:p="http://schemas.openxmlformats.org/presentationml/2006/main">
+  <p:cSld>
+    <p:bg>
+      <p:bgPr>
         <a:solidFill>
           <a:schemeClr val="bg1"/>
         </a:solidFill>
@@ -6545,6 +6915,395 @@
     <p:extLst>
       <p:ext uri="{BB962C8B-B14F-4D97-AF65-F5344CB8AC3E}">
         <p14:creationId xmlns:p14="http://schemas.microsoft.com/office/powerpoint/2010/main" val="3363758967"/>
+      </p:ext>
+    </p:extLst>
+  </p:cSld>
+  <p:clrMapOvr>
+    <a:masterClrMapping/>
+  </p:clrMapOvr>
+</p:sld>
+</file>
+
+<file path=ppt/slides/slide12.xml><?xml version="1.0" encoding="utf-8"?>
+<p:sld xmlns:a="http://schemas.openxmlformats.org/drawingml/2006/main" xmlns:r="http://schemas.openxmlformats.org/officeDocument/2006/relationships" xmlns:p="http://schemas.openxmlformats.org/presentationml/2006/main">
+  <p:cSld>
+    <p:spTree>
+      <p:nvGrpSpPr>
+        <p:cNvPr id="1" name=""/>
+        <p:cNvGrpSpPr/>
+        <p:nvPr/>
+      </p:nvGrpSpPr>
+      <p:grpSpPr>
+        <a:xfrm>
+          <a:off x="0" y="0"/>
+          <a:ext cx="0" cy="0"/>
+          <a:chOff x="0" y="0"/>
+          <a:chExt cx="0" cy="0"/>
+        </a:xfrm>
+      </p:grpSpPr>
+      <p:sp>
+        <p:nvSpPr>
+          <p:cNvPr id="2" name="Cím 1">
+            <a:extLst>
+              <a:ext uri="{FF2B5EF4-FFF2-40B4-BE49-F238E27FC236}">
+                <a16:creationId xmlns:a16="http://schemas.microsoft.com/office/drawing/2014/main" id="{27DDEA35-58F7-43B0-BE6D-D533CBD564EE}"/>
+              </a:ext>
+            </a:extLst>
+          </p:cNvPr>
+          <p:cNvSpPr>
+            <a:spLocks noGrp="1"/>
+          </p:cNvSpPr>
+          <p:nvPr>
+            <p:ph type="title"/>
+          </p:nvPr>
+        </p:nvSpPr>
+        <p:spPr>
+          <a:xfrm>
+            <a:off x="919119" y="2173706"/>
+            <a:ext cx="10353762" cy="970450"/>
+          </a:xfrm>
+        </p:spPr>
+        <p:txBody>
+          <a:bodyPr>
+            <a:noAutofit/>
+          </a:bodyPr>
+          <a:lstStyle/>
+          <a:p>
+            <a:r>
+              <a:rPr lang="hu-HU" sz="6000" dirty="0">
+                <a:solidFill>
+                  <a:schemeClr val="tx1"/>
+                </a:solidFill>
+              </a:rPr>
+              <a:t>Köszönjük a figyelmet!</a:t>
+            </a:r>
+          </a:p>
+        </p:txBody>
+      </p:sp>
+      <p:sp>
+        <p:nvSpPr>
+          <p:cNvPr id="3" name="Szövegdoboz 2">
+            <a:extLst>
+              <a:ext uri="{FF2B5EF4-FFF2-40B4-BE49-F238E27FC236}">
+                <a16:creationId xmlns:a16="http://schemas.microsoft.com/office/drawing/2014/main" id="{4A8A1306-49F9-4200-9890-9D6539B66155}"/>
+              </a:ext>
+            </a:extLst>
+          </p:cNvPr>
+          <p:cNvSpPr txBox="1"/>
+          <p:nvPr/>
+        </p:nvSpPr>
+        <p:spPr>
+          <a:xfrm>
+            <a:off x="560772" y="4672786"/>
+            <a:ext cx="11070455" cy="2185214"/>
+          </a:xfrm>
+          <a:prstGeom prst="rect">
+            <a:avLst/>
+          </a:prstGeom>
+          <a:noFill/>
+        </p:spPr>
+        <p:txBody>
+          <a:bodyPr wrap="square" rtlCol="0">
+            <a:spAutoFit/>
+          </a:bodyPr>
+          <a:lstStyle/>
+          <a:p>
+            <a:pPr marL="0" marR="0" lvl="0" indent="0" algn="ctr" defTabSz="457200" rtl="0" eaLnBrk="1" fontAlgn="auto" latinLnBrk="0" hangingPunct="1">
+              <a:lnSpc>
+                <a:spcPct val="100000"/>
+              </a:lnSpc>
+              <a:spcBef>
+                <a:spcPts val="0"/>
+              </a:spcBef>
+              <a:spcAft>
+                <a:spcPts val="0"/>
+              </a:spcAft>
+              <a:buClrTx/>
+              <a:buSzTx/>
+              <a:buFontTx/>
+              <a:buNone/>
+              <a:tabLst/>
+              <a:defRPr/>
+            </a:pPr>
+            <a:r>
+              <a:rPr kumimoji="0" lang="hu-HU" sz="3600" b="0" i="0" u="none" strike="noStrike" kern="1200" cap="none" spc="0" normalizeH="0" baseline="0" noProof="0" dirty="0">
+                <a:ln>
+                  <a:noFill/>
+                </a:ln>
+                <a:solidFill>
+                  <a:srgbClr val="FF0000"/>
+                </a:solidFill>
+                <a:effectLst/>
+                <a:uLnTx/>
+                <a:uFillTx/>
+                <a:latin typeface="Calisto MT" panose="02040603050505030304"/>
+                <a:ea typeface="+mn-ea"/>
+                <a:cs typeface="+mn-cs"/>
+              </a:rPr>
+              <a:t>JMTV</a:t>
+            </a:r>
+            <a:r>
+              <a:rPr kumimoji="0" lang="hu-HU" sz="3600" b="0" i="0" u="none" strike="noStrike" kern="1200" cap="none" spc="0" normalizeH="0" baseline="0" noProof="0" dirty="0">
+                <a:ln>
+                  <a:noFill/>
+                </a:ln>
+                <a:solidFill>
+                  <a:prstClr val="white"/>
+                </a:solidFill>
+                <a:effectLst/>
+                <a:uLnTx/>
+                <a:uFillTx/>
+                <a:latin typeface="Calisto MT" panose="02040603050505030304"/>
+                <a:ea typeface="+mn-ea"/>
+                <a:cs typeface="+mn-cs"/>
+              </a:rPr>
+              <a:t> csapat</a:t>
+            </a:r>
+          </a:p>
+          <a:p>
+            <a:pPr marL="0" marR="0" lvl="0" indent="0" algn="ctr" defTabSz="457200" rtl="0" eaLnBrk="1" fontAlgn="auto" latinLnBrk="0" hangingPunct="1">
+              <a:lnSpc>
+                <a:spcPct val="100000"/>
+              </a:lnSpc>
+              <a:spcBef>
+                <a:spcPts val="0"/>
+              </a:spcBef>
+              <a:spcAft>
+                <a:spcPts val="0"/>
+              </a:spcAft>
+              <a:buClrTx/>
+              <a:buSzTx/>
+              <a:buFontTx/>
+              <a:buNone/>
+              <a:tabLst/>
+              <a:defRPr/>
+            </a:pPr>
+            <a:endParaRPr kumimoji="0" lang="hu-HU" sz="3600" b="0" i="0" u="none" strike="noStrike" kern="1200" cap="none" spc="0" normalizeH="0" baseline="0" noProof="0" dirty="0">
+              <a:ln>
+                <a:noFill/>
+              </a:ln>
+              <a:solidFill>
+                <a:prstClr val="white"/>
+              </a:solidFill>
+              <a:effectLst/>
+              <a:uLnTx/>
+              <a:uFillTx/>
+              <a:latin typeface="Calisto MT" panose="02040603050505030304"/>
+              <a:ea typeface="+mn-ea"/>
+              <a:cs typeface="+mn-cs"/>
+            </a:endParaRPr>
+          </a:p>
+          <a:p>
+            <a:pPr marL="0" marR="0" lvl="0" indent="0" algn="ctr" defTabSz="457200" rtl="0" eaLnBrk="1" fontAlgn="auto" latinLnBrk="0" hangingPunct="1">
+              <a:lnSpc>
+                <a:spcPct val="100000"/>
+              </a:lnSpc>
+              <a:spcBef>
+                <a:spcPts val="0"/>
+              </a:spcBef>
+              <a:spcAft>
+                <a:spcPts val="0"/>
+              </a:spcAft>
+              <a:buClrTx/>
+              <a:buSzTx/>
+              <a:buFontTx/>
+              <a:buNone/>
+              <a:tabLst/>
+              <a:defRPr/>
+            </a:pPr>
+            <a:r>
+              <a:rPr kumimoji="0" lang="hu-HU" sz="2800" b="0" i="0" u="none" strike="noStrike" kern="1200" cap="none" spc="0" normalizeH="0" baseline="0" noProof="0" dirty="0">
+                <a:ln>
+                  <a:noFill/>
+                </a:ln>
+                <a:solidFill>
+                  <a:prstClr val="white"/>
+                </a:solidFill>
+                <a:effectLst/>
+                <a:uLnTx/>
+                <a:uFillTx/>
+                <a:latin typeface="Calisto MT" panose="02040603050505030304"/>
+                <a:ea typeface="+mn-ea"/>
+                <a:cs typeface="+mn-cs"/>
+              </a:rPr>
+              <a:t>Popovics </a:t>
+            </a:r>
+            <a:r>
+              <a:rPr kumimoji="0" lang="hu-HU" sz="2800" b="0" i="0" u="none" strike="noStrike" kern="1200" cap="none" spc="0" normalizeH="0" baseline="0" noProof="0" dirty="0">
+                <a:ln>
+                  <a:noFill/>
+                </a:ln>
+                <a:solidFill>
+                  <a:srgbClr val="FF0000"/>
+                </a:solidFill>
+                <a:effectLst/>
+                <a:uLnTx/>
+                <a:uFillTx/>
+                <a:latin typeface="Calisto MT" panose="02040603050505030304"/>
+                <a:ea typeface="+mn-ea"/>
+                <a:cs typeface="+mn-cs"/>
+              </a:rPr>
+              <a:t>J</a:t>
+            </a:r>
+            <a:r>
+              <a:rPr kumimoji="0" lang="hu-HU" sz="2800" b="0" i="0" u="none" strike="noStrike" kern="1200" cap="none" spc="0" normalizeH="0" baseline="0" noProof="0" dirty="0">
+                <a:ln>
+                  <a:noFill/>
+                </a:ln>
+                <a:solidFill>
+                  <a:prstClr val="white"/>
+                </a:solidFill>
+                <a:effectLst/>
+                <a:uLnTx/>
+                <a:uFillTx/>
+                <a:latin typeface="Calisto MT" panose="02040603050505030304"/>
+                <a:ea typeface="+mn-ea"/>
+                <a:cs typeface="+mn-cs"/>
+              </a:rPr>
+              <a:t>ános | Benke </a:t>
+            </a:r>
+            <a:r>
+              <a:rPr kumimoji="0" lang="hu-HU" sz="2800" b="0" i="0" u="none" strike="noStrike" kern="1200" cap="none" spc="0" normalizeH="0" baseline="0" noProof="0" dirty="0">
+                <a:ln>
+                  <a:noFill/>
+                </a:ln>
+                <a:solidFill>
+                  <a:srgbClr val="FF0000"/>
+                </a:solidFill>
+                <a:effectLst/>
+                <a:uLnTx/>
+                <a:uFillTx/>
+                <a:latin typeface="Calisto MT" panose="02040603050505030304"/>
+                <a:ea typeface="+mn-ea"/>
+                <a:cs typeface="+mn-cs"/>
+              </a:rPr>
+              <a:t>M</a:t>
+            </a:r>
+            <a:r>
+              <a:rPr kumimoji="0" lang="hu-HU" sz="2800" b="0" i="0" u="none" strike="noStrike" kern="1200" cap="none" spc="0" normalizeH="0" baseline="0" noProof="0" dirty="0">
+                <a:ln>
+                  <a:noFill/>
+                </a:ln>
+                <a:solidFill>
+                  <a:prstClr val="white"/>
+                </a:solidFill>
+                <a:effectLst/>
+                <a:uLnTx/>
+                <a:uFillTx/>
+                <a:latin typeface="Calisto MT" panose="02040603050505030304"/>
+                <a:ea typeface="+mn-ea"/>
+                <a:cs typeface="+mn-cs"/>
+              </a:rPr>
+              <a:t>ária | Balogh </a:t>
+            </a:r>
+            <a:r>
+              <a:rPr kumimoji="0" lang="hu-HU" sz="2800" b="0" i="0" u="none" strike="noStrike" kern="1200" cap="none" spc="0" normalizeH="0" baseline="0" noProof="0" dirty="0">
+                <a:ln>
+                  <a:noFill/>
+                </a:ln>
+                <a:solidFill>
+                  <a:srgbClr val="FF0000"/>
+                </a:solidFill>
+                <a:effectLst/>
+                <a:uLnTx/>
+                <a:uFillTx/>
+                <a:latin typeface="Calisto MT" panose="02040603050505030304"/>
+                <a:ea typeface="+mn-ea"/>
+                <a:cs typeface="+mn-cs"/>
+              </a:rPr>
+              <a:t>T</a:t>
+            </a:r>
+            <a:r>
+              <a:rPr kumimoji="0" lang="hu-HU" sz="2800" b="0" i="0" u="none" strike="noStrike" kern="1200" cap="none" spc="0" normalizeH="0" baseline="0" noProof="0" dirty="0">
+                <a:ln>
+                  <a:noFill/>
+                </a:ln>
+                <a:solidFill>
+                  <a:prstClr val="white"/>
+                </a:solidFill>
+                <a:effectLst/>
+                <a:uLnTx/>
+                <a:uFillTx/>
+                <a:latin typeface="Calisto MT" panose="02040603050505030304"/>
+                <a:ea typeface="+mn-ea"/>
+                <a:cs typeface="+mn-cs"/>
+              </a:rPr>
+              <a:t>ünde Éva | Buda </a:t>
+            </a:r>
+            <a:r>
+              <a:rPr kumimoji="0" lang="hu-HU" sz="2800" b="0" i="0" u="none" strike="noStrike" kern="1200" cap="none" spc="0" normalizeH="0" baseline="0" noProof="0" dirty="0">
+                <a:ln>
+                  <a:noFill/>
+                </a:ln>
+                <a:solidFill>
+                  <a:srgbClr val="FF0000"/>
+                </a:solidFill>
+                <a:effectLst/>
+                <a:uLnTx/>
+                <a:uFillTx/>
+                <a:latin typeface="Calisto MT" panose="02040603050505030304"/>
+                <a:ea typeface="+mn-ea"/>
+                <a:cs typeface="+mn-cs"/>
+              </a:rPr>
+              <a:t>V</a:t>
+            </a:r>
+            <a:r>
+              <a:rPr kumimoji="0" lang="hu-HU" sz="2800" b="0" i="0" u="none" strike="noStrike" kern="1200" cap="none" spc="0" normalizeH="0" baseline="0" noProof="0" dirty="0">
+                <a:ln>
+                  <a:noFill/>
+                </a:ln>
+                <a:solidFill>
+                  <a:prstClr val="white"/>
+                </a:solidFill>
+                <a:effectLst/>
+                <a:uLnTx/>
+                <a:uFillTx/>
+                <a:latin typeface="Calisto MT" panose="02040603050505030304"/>
+                <a:ea typeface="+mn-ea"/>
+                <a:cs typeface="+mn-cs"/>
+              </a:rPr>
+              <a:t>iktor</a:t>
+            </a:r>
+          </a:p>
+          <a:p>
+            <a:pPr marL="0" marR="0" lvl="0" indent="0" algn="l" defTabSz="457200" rtl="0" eaLnBrk="1" fontAlgn="auto" latinLnBrk="0" hangingPunct="1">
+              <a:lnSpc>
+                <a:spcPct val="100000"/>
+              </a:lnSpc>
+              <a:spcBef>
+                <a:spcPts val="0"/>
+              </a:spcBef>
+              <a:spcAft>
+                <a:spcPts val="0"/>
+              </a:spcAft>
+              <a:buClrTx/>
+              <a:buSzTx/>
+              <a:buFontTx/>
+              <a:buNone/>
+              <a:tabLst/>
+              <a:defRPr/>
+            </a:pPr>
+            <a:endParaRPr kumimoji="0" lang="hu-HU" sz="3600" b="0" i="0" u="none" strike="noStrike" kern="1200" cap="none" spc="0" normalizeH="0" baseline="0" noProof="0" dirty="0">
+              <a:ln>
+                <a:noFill/>
+              </a:ln>
+              <a:solidFill>
+                <a:prstClr val="white"/>
+              </a:solidFill>
+              <a:effectLst/>
+              <a:uLnTx/>
+              <a:uFillTx/>
+              <a:latin typeface="Calisto MT" panose="02040603050505030304"/>
+              <a:ea typeface="+mn-ea"/>
+              <a:cs typeface="+mn-cs"/>
+            </a:endParaRPr>
+          </a:p>
+        </p:txBody>
+      </p:sp>
+    </p:spTree>
+    <p:extLst>
+      <p:ext uri="{BB962C8B-B14F-4D97-AF65-F5344CB8AC3E}">
+        <p14:creationId xmlns:p14="http://schemas.microsoft.com/office/powerpoint/2010/main" val="2192535379"/>
       </p:ext>
     </p:extLst>
   </p:cSld>
@@ -9885,25 +10644,6 @@
 <file path=ppt/slides/slide9.xml><?xml version="1.0" encoding="utf-8"?>
 <p:sld xmlns:a="http://schemas.openxmlformats.org/drawingml/2006/main" xmlns:r="http://schemas.openxmlformats.org/officeDocument/2006/relationships" xmlns:p="http://schemas.openxmlformats.org/presentationml/2006/main">
   <p:cSld>
-    <p:bg>
-      <p:bgPr>
-        <a:blipFill rotWithShape="1">
-          <a:blip r:embed="rId2">
-            <a:duotone>
-              <a:schemeClr val="bg2">
-                <a:shade val="80000"/>
-                <a:lumMod val="80000"/>
-              </a:schemeClr>
-              <a:schemeClr val="bg2">
-                <a:tint val="98000"/>
-              </a:schemeClr>
-            </a:duotone>
-          </a:blip>
-          <a:stretch/>
-        </a:blipFill>
-        <a:effectLst/>
-      </p:bgPr>
-    </p:bg>
     <p:spTree>
       <p:nvGrpSpPr>
         <p:cNvPr id="1" name=""/>
@@ -9918,12 +10658,114 @@
           <a:chExt cx="0" cy="0"/>
         </a:xfrm>
       </p:grpSpPr>
+      <p:sp>
+        <p:nvSpPr>
+          <p:cNvPr id="2" name="Cím 1">
+            <a:extLst>
+              <a:ext uri="{FF2B5EF4-FFF2-40B4-BE49-F238E27FC236}">
+                <a16:creationId xmlns:a16="http://schemas.microsoft.com/office/drawing/2014/main" id="{5064CB28-CDB9-4690-9DCD-82B2C332430D}"/>
+              </a:ext>
+            </a:extLst>
+          </p:cNvPr>
+          <p:cNvSpPr>
+            <a:spLocks noGrp="1"/>
+          </p:cNvSpPr>
+          <p:nvPr>
+            <p:ph type="title"/>
+          </p:nvPr>
+        </p:nvSpPr>
+        <p:spPr/>
+        <p:txBody>
+          <a:bodyPr/>
+          <a:lstStyle/>
+          <a:p>
+            <a:r>
+              <a:rPr lang="hu-HU" b="1" dirty="0"/>
+              <a:t>3. Projekt Végrehajtás</a:t>
+            </a:r>
+          </a:p>
+        </p:txBody>
+      </p:sp>
+      <p:sp>
+        <p:nvSpPr>
+          <p:cNvPr id="3" name="Tartalom helye 2">
+            <a:extLst>
+              <a:ext uri="{FF2B5EF4-FFF2-40B4-BE49-F238E27FC236}">
+                <a16:creationId xmlns:a16="http://schemas.microsoft.com/office/drawing/2014/main" id="{E9E2A0C4-FE00-4576-A475-917AD0845D01}"/>
+              </a:ext>
+            </a:extLst>
+          </p:cNvPr>
+          <p:cNvSpPr>
+            <a:spLocks noGrp="1"/>
+          </p:cNvSpPr>
+          <p:nvPr>
+            <p:ph idx="1"/>
+          </p:nvPr>
+        </p:nvSpPr>
+        <p:spPr>
+          <a:xfrm>
+            <a:off x="8471591" y="1884849"/>
+            <a:ext cx="3383903" cy="2593846"/>
+          </a:xfrm>
+        </p:spPr>
+        <p:txBody>
+          <a:bodyPr/>
+          <a:lstStyle/>
+          <a:p>
+            <a:pPr marL="36900" indent="0">
+              <a:buNone/>
+            </a:pPr>
+            <a:r>
+              <a:rPr lang="hu-HU" sz="2400" b="1" dirty="0"/>
+              <a:t>Használt platformok</a:t>
+            </a:r>
+          </a:p>
+          <a:p>
+            <a:r>
+              <a:rPr lang="hu-HU" dirty="0" err="1"/>
+              <a:t>Trello</a:t>
+            </a:r>
+            <a:endParaRPr lang="hu-HU" dirty="0"/>
+          </a:p>
+          <a:p>
+            <a:r>
+              <a:rPr lang="hu-HU" dirty="0"/>
+              <a:t>GitHub</a:t>
+            </a:r>
+          </a:p>
+          <a:p>
+            <a:r>
+              <a:rPr lang="hu-HU" dirty="0"/>
+              <a:t>Python IDLE</a:t>
+            </a:r>
+          </a:p>
+          <a:p>
+            <a:r>
+              <a:rPr lang="hu-HU" dirty="0"/>
+              <a:t>Visual </a:t>
+            </a:r>
+            <a:r>
+              <a:rPr lang="hu-HU" dirty="0" err="1"/>
+              <a:t>Studio</a:t>
+            </a:r>
+            <a:r>
+              <a:rPr lang="hu-HU" dirty="0"/>
+              <a:t> </a:t>
+            </a:r>
+            <a:r>
+              <a:rPr lang="hu-HU" dirty="0" err="1"/>
+              <a:t>Code</a:t>
+            </a:r>
+            <a:endParaRPr lang="hu-HU" dirty="0"/>
+          </a:p>
+        </p:txBody>
+      </p:sp>
       <p:pic>
         <p:nvPicPr>
-          <p:cNvPr id="5" name="Kép 4" descr="A képen szöveg, személy, dokumentum látható&#10;&#10;Automatikusan generált leírás">
+          <p:cNvPr id="5" name="Kép 4" descr="A képen szöveg látható&#10;&#10;Automatikusan generált leírás">
             <a:extLst>
               <a:ext uri="{FF2B5EF4-FFF2-40B4-BE49-F238E27FC236}">
-                <a16:creationId xmlns:a16="http://schemas.microsoft.com/office/drawing/2014/main" id="{D6A9AEA2-1B3B-40EE-A265-645CA0EACCFE}"/>
+                <a16:creationId xmlns:a16="http://schemas.microsoft.com/office/drawing/2014/main" id="{B72C4F72-1CA7-4419-A4E3-E7E71B116D82}"/>
               </a:ext>
             </a:extLst>
           </p:cNvPr>
@@ -9932,7 +10774,43 @@
           </p:cNvPicPr>
           <p:nvPr/>
         </p:nvPicPr>
-        <p:blipFill rotWithShape="1">
+        <p:blipFill>
+          <a:blip r:embed="rId2">
+            <a:extLst>
+              <a:ext uri="{28A0092B-C50C-407E-A947-70E740481C1C}">
+                <a14:useLocalDpi xmlns:a14="http://schemas.microsoft.com/office/drawing/2010/main" val="0"/>
+              </a:ext>
+            </a:extLst>
+          </a:blip>
+          <a:stretch>
+            <a:fillRect/>
+          </a:stretch>
+        </p:blipFill>
+        <p:spPr>
+          <a:xfrm>
+            <a:off x="5488413" y="5286746"/>
+            <a:ext cx="4877897" cy="1160705"/>
+          </a:xfrm>
+          <a:prstGeom prst="rect">
+            <a:avLst/>
+          </a:prstGeom>
+        </p:spPr>
+      </p:pic>
+      <p:pic>
+        <p:nvPicPr>
+          <p:cNvPr id="9" name="Kép 8">
+            <a:extLst>
+              <a:ext uri="{FF2B5EF4-FFF2-40B4-BE49-F238E27FC236}">
+                <a16:creationId xmlns:a16="http://schemas.microsoft.com/office/drawing/2014/main" id="{766C7D61-2C3E-48DD-A53C-8D3B192A2C0E}"/>
+              </a:ext>
+            </a:extLst>
+          </p:cNvPr>
+          <p:cNvPicPr>
+            <a:picLocks noChangeAspect="1"/>
+          </p:cNvPicPr>
+          <p:nvPr/>
+        </p:nvPicPr>
+        <p:blipFill>
           <a:blip r:embed="rId3">
             <a:extLst>
               <a:ext uri="{28A0092B-C50C-407E-A947-70E740481C1C}">
@@ -9940,302 +10818,96 @@
               </a:ext>
             </a:extLst>
           </a:blip>
-          <a:srcRect t="13866" b="1865"/>
-          <a:stretch/>
+          <a:stretch>
+            <a:fillRect/>
+          </a:stretch>
         </p:blipFill>
         <p:spPr>
           <a:xfrm>
-            <a:off x="1" y="10"/>
-            <a:ext cx="12192000" cy="6857990"/>
+            <a:off x="522072" y="4653392"/>
+            <a:ext cx="3919300" cy="2204607"/>
           </a:xfrm>
           <a:prstGeom prst="rect">
             <a:avLst/>
           </a:prstGeom>
         </p:spPr>
       </p:pic>
-      <p:sp useBgFill="1">
-        <p:nvSpPr>
-          <p:cNvPr id="10" name="Freeform 5">
+      <p:pic>
+        <p:nvPicPr>
+          <p:cNvPr id="6" name="Kép 5">
             <a:extLst>
               <a:ext uri="{FF2B5EF4-FFF2-40B4-BE49-F238E27FC236}">
-                <a16:creationId xmlns:a16="http://schemas.microsoft.com/office/drawing/2014/main" id="{37D54B6C-87D0-4C03-8335-3955179D2B5B}"/>
-              </a:ext>
-              <a:ext uri="{C183D7F6-B498-43B3-948B-1728B52AA6E4}">
-                <adec:decorative xmlns:adec="http://schemas.microsoft.com/office/drawing/2017/decorative" val="1"/>
+                <a16:creationId xmlns:a16="http://schemas.microsoft.com/office/drawing/2014/main" id="{71A4532C-686F-4644-A82B-E898436C948F}"/>
               </a:ext>
             </a:extLst>
           </p:cNvPr>
-          <p:cNvSpPr>
-            <a:spLocks noGrp="1" noRot="1" noChangeAspect="1" noMove="1" noResize="1" noEditPoints="1" noAdjustHandles="1" noChangeArrowheads="1" noChangeShapeType="1" noTextEdit="1"/>
-          </p:cNvSpPr>
-          <p:nvPr>
-            <p:extLst>
-              <p:ext uri="{386F3935-93C4-4BCD-93E2-E3B085C9AB24}">
-                <p16:designElem xmlns:p16="http://schemas.microsoft.com/office/powerpoint/2015/main" val="1"/>
-              </p:ext>
-            </p:extLst>
-          </p:nvPr>
-        </p:nvSpPr>
-        <p:spPr bwMode="auto">
-          <a:xfrm rot="5400000">
-            <a:off x="-118536" y="1371603"/>
-            <a:ext cx="5624423" cy="4100418"/>
+          <p:cNvPicPr>
+            <a:picLocks noChangeAspect="1"/>
+          </p:cNvPicPr>
+          <p:nvPr/>
+        </p:nvPicPr>
+        <p:blipFill>
+          <a:blip r:embed="rId4">
+            <a:extLst>
+              <a:ext uri="{28A0092B-C50C-407E-A947-70E740481C1C}">
+                <a14:useLocalDpi xmlns:a14="http://schemas.microsoft.com/office/drawing/2010/main" val="0"/>
+              </a:ext>
+            </a:extLst>
+          </a:blip>
+          <a:stretch>
+            <a:fillRect/>
+          </a:stretch>
+        </p:blipFill>
+        <p:spPr>
+          <a:xfrm>
+            <a:off x="4733730" y="2463282"/>
+            <a:ext cx="2612659" cy="1959494"/>
           </a:xfrm>
-          <a:custGeom>
+          <a:prstGeom prst="rect">
             <a:avLst/>
-            <a:gdLst>
-              <a:gd name="T0" fmla="*/ 1577 w 1601"/>
-              <a:gd name="T1" fmla="*/ 0 h 696"/>
-              <a:gd name="T2" fmla="*/ 833 w 1601"/>
-              <a:gd name="T3" fmla="*/ 0 h 696"/>
-              <a:gd name="T4" fmla="*/ 768 w 1601"/>
-              <a:gd name="T5" fmla="*/ 0 h 696"/>
-              <a:gd name="T6" fmla="*/ 24 w 1601"/>
-              <a:gd name="T7" fmla="*/ 0 h 696"/>
-              <a:gd name="T8" fmla="*/ 0 w 1601"/>
-              <a:gd name="T9" fmla="*/ 27 h 696"/>
-              <a:gd name="T10" fmla="*/ 0 w 1601"/>
-              <a:gd name="T11" fmla="*/ 669 h 696"/>
-              <a:gd name="T12" fmla="*/ 24 w 1601"/>
-              <a:gd name="T13" fmla="*/ 696 h 696"/>
-              <a:gd name="T14" fmla="*/ 768 w 1601"/>
-              <a:gd name="T15" fmla="*/ 696 h 696"/>
-              <a:gd name="T16" fmla="*/ 833 w 1601"/>
-              <a:gd name="T17" fmla="*/ 696 h 696"/>
-              <a:gd name="T18" fmla="*/ 1577 w 1601"/>
-              <a:gd name="T19" fmla="*/ 696 h 696"/>
-              <a:gd name="T20" fmla="*/ 1601 w 1601"/>
-              <a:gd name="T21" fmla="*/ 669 h 696"/>
-              <a:gd name="T22" fmla="*/ 1601 w 1601"/>
-              <a:gd name="T23" fmla="*/ 27 h 696"/>
-              <a:gd name="T24" fmla="*/ 1577 w 1601"/>
-              <a:gd name="T25" fmla="*/ 0 h 696"/>
-            </a:gdLst>
-            <a:ahLst/>
-            <a:cxnLst>
-              <a:cxn ang="0">
-                <a:pos x="T0" y="T1"/>
-              </a:cxn>
-              <a:cxn ang="0">
-                <a:pos x="T2" y="T3"/>
-              </a:cxn>
-              <a:cxn ang="0">
-                <a:pos x="T4" y="T5"/>
-              </a:cxn>
-              <a:cxn ang="0">
-                <a:pos x="T6" y="T7"/>
-              </a:cxn>
-              <a:cxn ang="0">
-                <a:pos x="T8" y="T9"/>
-              </a:cxn>
-              <a:cxn ang="0">
-                <a:pos x="T10" y="T11"/>
-              </a:cxn>
-              <a:cxn ang="0">
-                <a:pos x="T12" y="T13"/>
-              </a:cxn>
-              <a:cxn ang="0">
-                <a:pos x="T14" y="T15"/>
-              </a:cxn>
-              <a:cxn ang="0">
-                <a:pos x="T16" y="T17"/>
-              </a:cxn>
-              <a:cxn ang="0">
-                <a:pos x="T18" y="T19"/>
-              </a:cxn>
-              <a:cxn ang="0">
-                <a:pos x="T20" y="T21"/>
-              </a:cxn>
-              <a:cxn ang="0">
-                <a:pos x="T22" y="T23"/>
-              </a:cxn>
-              <a:cxn ang="0">
-                <a:pos x="T24" y="T25"/>
-              </a:cxn>
-            </a:cxnLst>
-            <a:rect l="0" t="0" r="r" b="b"/>
-            <a:pathLst>
-              <a:path w="1601" h="696">
-                <a:moveTo>
-                  <a:pt x="1577" y="0"/>
-                </a:moveTo>
-                <a:cubicBezTo>
-                  <a:pt x="833" y="0"/>
-                  <a:pt x="833" y="0"/>
-                  <a:pt x="833" y="0"/>
-                </a:cubicBezTo>
-                <a:cubicBezTo>
-                  <a:pt x="768" y="0"/>
-                  <a:pt x="768" y="0"/>
-                  <a:pt x="768" y="0"/>
-                </a:cubicBezTo>
-                <a:cubicBezTo>
-                  <a:pt x="24" y="0"/>
-                  <a:pt x="24" y="0"/>
-                  <a:pt x="24" y="0"/>
-                </a:cubicBezTo>
-                <a:cubicBezTo>
-                  <a:pt x="11" y="0"/>
-                  <a:pt x="0" y="12"/>
-                  <a:pt x="0" y="27"/>
-                </a:cubicBezTo>
-                <a:cubicBezTo>
-                  <a:pt x="0" y="669"/>
-                  <a:pt x="0" y="669"/>
-                  <a:pt x="0" y="669"/>
-                </a:cubicBezTo>
-                <a:cubicBezTo>
-                  <a:pt x="0" y="684"/>
-                  <a:pt x="11" y="696"/>
-                  <a:pt x="24" y="696"/>
-                </a:cubicBezTo>
-                <a:cubicBezTo>
-                  <a:pt x="768" y="696"/>
-                  <a:pt x="768" y="696"/>
-                  <a:pt x="768" y="696"/>
-                </a:cubicBezTo>
-                <a:cubicBezTo>
-                  <a:pt x="833" y="696"/>
-                  <a:pt x="833" y="696"/>
-                  <a:pt x="833" y="696"/>
-                </a:cubicBezTo>
-                <a:cubicBezTo>
-                  <a:pt x="1577" y="696"/>
-                  <a:pt x="1577" y="696"/>
-                  <a:pt x="1577" y="696"/>
-                </a:cubicBezTo>
-                <a:cubicBezTo>
-                  <a:pt x="1590" y="696"/>
-                  <a:pt x="1601" y="684"/>
-                  <a:pt x="1601" y="669"/>
-                </a:cubicBezTo>
-                <a:cubicBezTo>
-                  <a:pt x="1601" y="27"/>
-                  <a:pt x="1601" y="27"/>
-                  <a:pt x="1601" y="27"/>
-                </a:cubicBezTo>
-                <a:cubicBezTo>
-                  <a:pt x="1601" y="12"/>
-                  <a:pt x="1590" y="0"/>
-                  <a:pt x="1577" y="0"/>
-                </a:cubicBezTo>
-                <a:close/>
-              </a:path>
-            </a:pathLst>
-          </a:custGeom>
-          <a:ln>
-            <a:noFill/>
-          </a:ln>
-          <a:effectLst>
-            <a:outerShdw blurRad="50800" dist="38100" dir="5400000" algn="tl" rotWithShape="0">
-              <a:srgbClr val="000000">
-                <a:alpha val="43000"/>
-              </a:srgbClr>
-            </a:outerShdw>
-          </a:effectLst>
-          <a:extLst>
-            <a:ext uri="{91240B29-F687-4f45-9708-019B960494DF}">
-              <a14:hiddenLine xmlns="" xmlns:a16="http://schemas.microsoft.com/office/drawing/2014/main" xmlns:p14="http://schemas.microsoft.com/office/powerpoint/2010/main" xmlns:a14="http://schemas.microsoft.com/office/drawing/2010/main" w="9525">
-                <a:solidFill>
-                  <a:srgbClr val="000000"/>
-                </a:solidFill>
-                <a:round/>
-                <a:headEnd/>
-                <a:tailEnd/>
-              </a14:hiddenLine>
-            </a:ext>
-          </a:extLst>
+          </a:prstGeom>
         </p:spPr>
-        <p:txBody>
-          <a:bodyPr vert="horz" wrap="square" lIns="91440" tIns="45720" rIns="91440" bIns="45720" numCol="1" anchor="t" anchorCtr="0" compatLnSpc="1">
-            <a:prstTxWarp prst="textNoShape">
-              <a:avLst/>
-            </a:prstTxWarp>
-          </a:bodyPr>
-          <a:lstStyle/>
-          <a:p>
-            <a:endParaRPr lang="en-US"/>
-          </a:p>
-        </p:txBody>
-      </p:sp>
-      <p:sp>
-        <p:nvSpPr>
-          <p:cNvPr id="2" name="Cím 1">
+      </p:pic>
+      <p:pic>
+        <p:nvPicPr>
+          <p:cNvPr id="10" name="Kép 9">
             <a:extLst>
               <a:ext uri="{FF2B5EF4-FFF2-40B4-BE49-F238E27FC236}">
-                <a16:creationId xmlns:a16="http://schemas.microsoft.com/office/drawing/2014/main" id="{58D53D3E-A1D8-418F-A1DF-1432AD39025F}"/>
+                <a16:creationId xmlns:a16="http://schemas.microsoft.com/office/drawing/2014/main" id="{8532EED2-B357-4B32-86B8-9927B2009365}"/>
               </a:ext>
             </a:extLst>
           </p:cNvPr>
-          <p:cNvSpPr>
-            <a:spLocks noGrp="1"/>
-          </p:cNvSpPr>
-          <p:nvPr>
-            <p:ph type="title"/>
-          </p:nvPr>
-        </p:nvSpPr>
+          <p:cNvPicPr>
+            <a:picLocks noChangeAspect="1"/>
+          </p:cNvPicPr>
+          <p:nvPr/>
+        </p:nvPicPr>
+        <p:blipFill>
+          <a:blip r:embed="rId5">
+            <a:extLst>
+              <a:ext uri="{28A0092B-C50C-407E-A947-70E740481C1C}">
+                <a14:useLocalDpi xmlns:a14="http://schemas.microsoft.com/office/drawing/2010/main" val="0"/>
+              </a:ext>
+            </a:extLst>
+          </a:blip>
+          <a:stretch>
+            <a:fillRect/>
+          </a:stretch>
+        </p:blipFill>
         <p:spPr>
           <a:xfrm>
-            <a:off x="913795" y="845388"/>
-            <a:ext cx="3596420" cy="979016"/>
+            <a:off x="522072" y="2413591"/>
+            <a:ext cx="3610343" cy="2030818"/>
           </a:xfrm>
+          <a:prstGeom prst="rect">
+            <a:avLst/>
+          </a:prstGeom>
         </p:spPr>
-        <p:txBody>
-          <a:bodyPr anchor="b">
-            <a:normAutofit/>
-          </a:bodyPr>
-          <a:lstStyle/>
-          <a:p>
-            <a:pPr algn="l"/>
-            <a:r>
-              <a:rPr lang="hu-HU" sz="2400" b="1" dirty="0"/>
-              <a:t>3. Projekt Átadása és Értékelése</a:t>
-            </a:r>
-          </a:p>
-        </p:txBody>
-      </p:sp>
-      <p:sp>
-        <p:nvSpPr>
-          <p:cNvPr id="3" name="Tartalom helye 2">
-            <a:extLst>
-              <a:ext uri="{FF2B5EF4-FFF2-40B4-BE49-F238E27FC236}">
-                <a16:creationId xmlns:a16="http://schemas.microsoft.com/office/drawing/2014/main" id="{E5EBA43E-BFDA-4125-A8B7-B569F8A83E92}"/>
-              </a:ext>
-            </a:extLst>
-          </p:cNvPr>
-          <p:cNvSpPr>
-            <a:spLocks noGrp="1"/>
-          </p:cNvSpPr>
-          <p:nvPr>
-            <p:ph idx="1"/>
-          </p:nvPr>
-        </p:nvSpPr>
-        <p:spPr>
-          <a:xfrm>
-            <a:off x="913795" y="1968237"/>
-            <a:ext cx="3531684" cy="3679189"/>
-          </a:xfrm>
-        </p:spPr>
-        <p:txBody>
-          <a:bodyPr anchor="t">
-            <a:normAutofit/>
-          </a:bodyPr>
-          <a:lstStyle/>
-          <a:p>
-            <a:pPr marL="36900" indent="0">
-              <a:buNone/>
-            </a:pPr>
-            <a:r>
-              <a:rPr lang="hu-HU" altLang="hu-HU" sz="1600"/>
-              <a:t>A projekt átadása  a sikeres tesztüzem és a sikeres internetre történő feltöltés után történik meg, mely során további egyeztetések követik és a projekt célok és azok megvalósulásainak ellenőrzése valósul meg.</a:t>
-            </a:r>
-          </a:p>
-        </p:txBody>
-      </p:sp>
+      </p:pic>
     </p:spTree>
     <p:extLst>
       <p:ext uri="{BB962C8B-B14F-4D97-AF65-F5344CB8AC3E}">
-        <p14:creationId xmlns:p14="http://schemas.microsoft.com/office/powerpoint/2010/main" val="2482923537"/>
+        <p14:creationId xmlns:p14="http://schemas.microsoft.com/office/powerpoint/2010/main" val="3717095195"/>
       </p:ext>
     </p:extLst>
   </p:cSld>

</xml_diff>